<commit_message>
Computer Vision Facial Recog DEMO
</commit_message>
<xml_diff>
--- a/SAC 2/Computer Vision.pptx
+++ b/SAC 2/Computer Vision.pptx
@@ -139,6 +139,67 @@
     </p:ext>
   </p:extLst>
 </p:presentation>
+</file>
+
+<file path=ppt/changesInfos/changesInfo1.xml><?xml version="1.0" encoding="utf-8"?>
+<pc:chgInfo xmlns:a="http://schemas.openxmlformats.org/drawingml/2006/main" xmlns:r="http://schemas.openxmlformats.org/officeDocument/2006/relationships" xmlns:ac="http://schemas.microsoft.com/office/drawing/2013/main/command" xmlns:pc="http://schemas.microsoft.com/office/powerpoint/2013/main/command">
+  <pc:docChgLst>
+    <pc:chgData name="Karna Amit" userId="512f0b414f2a6f27" providerId="LiveId" clId="{08D7A9DC-90E7-430A-A828-43AF039CBE92}"/>
+    <pc:docChg chg="custSel modSld">
+      <pc:chgData name="Karna Amit" userId="512f0b414f2a6f27" providerId="LiveId" clId="{08D7A9DC-90E7-430A-A828-43AF039CBE92}" dt="2020-07-29T11:03:49.425" v="87" actId="20577"/>
+      <pc:docMkLst>
+        <pc:docMk/>
+      </pc:docMkLst>
+      <pc:sldChg chg="addSp delSp modSp mod">
+        <pc:chgData name="Karna Amit" userId="512f0b414f2a6f27" providerId="LiveId" clId="{08D7A9DC-90E7-430A-A828-43AF039CBE92}" dt="2020-07-29T11:03:49.425" v="87" actId="20577"/>
+        <pc:sldMkLst>
+          <pc:docMk/>
+          <pc:sldMk cId="4145261392" sldId="267"/>
+        </pc:sldMkLst>
+        <pc:spChg chg="mod">
+          <ac:chgData name="Karna Amit" userId="512f0b414f2a6f27" providerId="LiveId" clId="{08D7A9DC-90E7-430A-A828-43AF039CBE92}" dt="2020-07-29T11:03:25.256" v="66" actId="20577"/>
+          <ac:spMkLst>
+            <pc:docMk/>
+            <pc:sldMk cId="4145261392" sldId="267"/>
+            <ac:spMk id="2" creationId="{00000000-0000-0000-0000-000000000000}"/>
+          </ac:spMkLst>
+        </pc:spChg>
+        <pc:spChg chg="del">
+          <ac:chgData name="Karna Amit" userId="512f0b414f2a6f27" providerId="LiveId" clId="{08D7A9DC-90E7-430A-A828-43AF039CBE92}" dt="2020-07-29T11:03:44.193" v="69" actId="478"/>
+          <ac:spMkLst>
+            <pc:docMk/>
+            <pc:sldMk cId="4145261392" sldId="267"/>
+            <ac:spMk id="3" creationId="{00000000-0000-0000-0000-000000000000}"/>
+          </ac:spMkLst>
+        </pc:spChg>
+        <pc:spChg chg="add del mod">
+          <ac:chgData name="Karna Amit" userId="512f0b414f2a6f27" providerId="LiveId" clId="{08D7A9DC-90E7-430A-A828-43AF039CBE92}" dt="2020-07-29T11:03:35.187" v="68" actId="478"/>
+          <ac:spMkLst>
+            <pc:docMk/>
+            <pc:sldMk cId="4145261392" sldId="267"/>
+            <ac:spMk id="6" creationId="{28E23272-990C-4138-A950-B95EF9611B28}"/>
+          </ac:spMkLst>
+        </pc:spChg>
+        <pc:spChg chg="add mod">
+          <ac:chgData name="Karna Amit" userId="512f0b414f2a6f27" providerId="LiveId" clId="{08D7A9DC-90E7-430A-A828-43AF039CBE92}" dt="2020-07-29T11:03:49.425" v="87" actId="20577"/>
+          <ac:spMkLst>
+            <pc:docMk/>
+            <pc:sldMk cId="4145261392" sldId="267"/>
+            <ac:spMk id="8" creationId="{8BB01FF3-C26B-42F4-B531-031A7DC57983}"/>
+          </ac:spMkLst>
+        </pc:spChg>
+        <pc:graphicFrameChg chg="del modGraphic">
+          <ac:chgData name="Karna Amit" userId="512f0b414f2a6f27" providerId="LiveId" clId="{08D7A9DC-90E7-430A-A828-43AF039CBE92}" dt="2020-07-29T11:03:06.097" v="1" actId="478"/>
+          <ac:graphicFrameMkLst>
+            <pc:docMk/>
+            <pc:sldMk cId="4145261392" sldId="267"/>
+            <ac:graphicFrameMk id="5" creationId="{00000000-0000-0000-0000-000000000000}"/>
+          </ac:graphicFrameMkLst>
+        </pc:graphicFrameChg>
+      </pc:sldChg>
+    </pc:docChg>
+  </pc:docChgLst>
+</pc:chgInfo>
 </file>
 
 <file path=ppt/diagrams/colors1.xml><?xml version="1.0" encoding="utf-8"?>
@@ -5319,7 +5380,7 @@
           <a:p>
             <a:fld id="{762B48F5-BACC-47D6-A0F7-82FBF9C6BC85}" type="datetimeFigureOut">
               <a:rPr lang="en-US"/>
-              <a:t>7/26/2020</a:t>
+              <a:t>7/29/2020</a:t>
             </a:fld>
             <a:endParaRPr/>
           </a:p>
@@ -5484,7 +5545,7 @@
           <a:p>
             <a:fld id="{0CB1CD00-5424-4675-AB18-2C419B060449}" type="datetimeFigureOut">
               <a:rPr lang="en-US"/>
-              <a:t>7/26/2020</a:t>
+              <a:t>7/29/2020</a:t>
             </a:fld>
             <a:endParaRPr/>
           </a:p>
@@ -6129,7 +6190,7 @@
           <a:p>
             <a:fld id="{37CC0096-1860-4642-9CD2-0079EA5E7CD1}" type="datetimeFigureOut">
               <a:rPr lang="en-US" smtClean="0"/>
-              <a:t>7/26/2020</a:t>
+              <a:t>7/29/2020</a:t>
             </a:fld>
             <a:endParaRPr lang="en-US"/>
           </a:p>
@@ -6308,7 +6369,7 @@
           <a:p>
             <a:fld id="{37CC0096-1860-4642-9CD2-0079EA5E7CD1}" type="datetimeFigureOut">
               <a:rPr lang="en-US" smtClean="0"/>
-              <a:t>7/26/2020</a:t>
+              <a:t>7/29/2020</a:t>
             </a:fld>
             <a:endParaRPr lang="en-US"/>
           </a:p>
@@ -6481,7 +6542,7 @@
           <a:p>
             <a:fld id="{37CC0096-1860-4642-9CD2-0079EA5E7CD1}" type="datetimeFigureOut">
               <a:rPr lang="en-US" smtClean="0"/>
-              <a:t>7/26/2020</a:t>
+              <a:t>7/29/2020</a:t>
             </a:fld>
             <a:endParaRPr lang="en-US"/>
           </a:p>
@@ -6914,7 +6975,7 @@
           <a:p>
             <a:fld id="{37CC0096-1860-4642-9CD2-0079EA5E7CD1}" type="datetimeFigureOut">
               <a:rPr lang="en-US" smtClean="0"/>
-              <a:t>7/26/2020</a:t>
+              <a:t>7/29/2020</a:t>
             </a:fld>
             <a:endParaRPr lang="en-US"/>
           </a:p>
@@ -7353,7 +7414,7 @@
           <a:p>
             <a:fld id="{37CC0096-1860-4642-9CD2-0079EA5E7CD1}" type="datetimeFigureOut">
               <a:rPr lang="en-US" smtClean="0"/>
-              <a:t>7/26/2020</a:t>
+              <a:t>7/29/2020</a:t>
             </a:fld>
             <a:endParaRPr lang="en-US"/>
           </a:p>
@@ -7470,7 +7531,7 @@
           <a:p>
             <a:fld id="{37CC0096-1860-4642-9CD2-0079EA5E7CD1}" type="datetimeFigureOut">
               <a:rPr lang="en-US" smtClean="0"/>
-              <a:t>7/26/2020</a:t>
+              <a:t>7/29/2020</a:t>
             </a:fld>
             <a:endParaRPr lang="en-US"/>
           </a:p>
@@ -7565,7 +7626,7 @@
           <a:p>
             <a:fld id="{37CC0096-1860-4642-9CD2-0079EA5E7CD1}" type="datetimeFigureOut">
               <a:rPr lang="en-US" smtClean="0"/>
-              <a:t>7/26/2020</a:t>
+              <a:t>7/29/2020</a:t>
             </a:fld>
             <a:endParaRPr lang="en-US"/>
           </a:p>
@@ -7849,7 +7910,7 @@
           <a:p>
             <a:fld id="{37CC0096-1860-4642-9CD2-0079EA5E7CD1}" type="datetimeFigureOut">
               <a:rPr lang="en-US" smtClean="0"/>
-              <a:t>7/26/2020</a:t>
+              <a:t>7/29/2020</a:t>
             </a:fld>
             <a:endParaRPr lang="en-US"/>
           </a:p>
@@ -8160,7 +8221,7 @@
           <a:p>
             <a:fld id="{37CC0096-1860-4642-9CD2-0079EA5E7CD1}" type="datetimeFigureOut">
               <a:rPr lang="en-US" smtClean="0"/>
-              <a:t>7/26/2020</a:t>
+              <a:t>7/29/2020</a:t>
             </a:fld>
             <a:endParaRPr lang="en-US"/>
           </a:p>
@@ -8392,7 +8453,7 @@
             <a:fld id="{37CC0096-1860-4642-9CD2-0079EA5E7CD1}" type="datetimeFigureOut">
               <a:rPr lang="en-US" smtClean="0"/>
               <a:pPr/>
-              <a:t>7/26/2020</a:t>
+              <a:t>7/29/2020</a:t>
             </a:fld>
             <a:endParaRPr lang="en-US"/>
           </a:p>
@@ -9149,14 +9210,22 @@
           <a:lstStyle/>
           <a:p>
             <a:r>
-              <a:t>Two Content Layout with Table</a:t>
+              <a:rPr lang="en-AU" dirty="0"/>
+              <a:t>What is Computer Vision</a:t>
             </a:r>
+            <a:endParaRPr dirty="0"/>
           </a:p>
         </p:txBody>
       </p:sp>
       <p:sp>
         <p:nvSpPr>
-          <p:cNvPr id="3" name="Content Placeholder 2"/>
+          <p:cNvPr id="8" name="Content Placeholder 7">
+            <a:extLst>
+              <a:ext uri="{FF2B5EF4-FFF2-40B4-BE49-F238E27FC236}">
+                <a16:creationId xmlns:a16="http://schemas.microsoft.com/office/drawing/2014/main" id="{8BB01FF3-C26B-42F4-B531-031A7DC57983}"/>
+              </a:ext>
+            </a:extLst>
+          </p:cNvPr>
           <p:cNvSpPr>
             <a:spLocks noGrp="1"/>
           </p:cNvSpPr>
@@ -9170,262 +9239,12 @@
           <a:lstStyle/>
           <a:p>
             <a:r>
-              <a:t>First bullet point here</a:t>
-            </a:r>
-          </a:p>
-          <a:p>
-            <a:r>
-              <a:t>Second bullet point here</a:t>
-            </a:r>
-          </a:p>
-          <a:p>
-            <a:r>
-              <a:t>Third bullet point here</a:t>
+              <a:rPr lang="en-AU"/>
+              <a:t>Computer vision </a:t>
             </a:r>
           </a:p>
         </p:txBody>
       </p:sp>
-      <p:graphicFrame>
-        <p:nvGraphicFramePr>
-          <p:cNvPr id="5" name="Content Placeholder 4"/>
-          <p:cNvGraphicFramePr>
-            <a:graphicFrameLocks noGrp="1"/>
-          </p:cNvGraphicFramePr>
-          <p:nvPr>
-            <p:ph sz="half" idx="2"/>
-            <p:extLst>
-              <p:ext uri="{D42A27DB-BD31-4B8C-83A1-F6EECF244321}">
-                <p14:modId xmlns:p14="http://schemas.microsoft.com/office/powerpoint/2010/main" val="1809551004"/>
-              </p:ext>
-            </p:extLst>
-          </p:nvPr>
-        </p:nvGraphicFramePr>
-        <p:xfrm>
-          <a:off x="6324600" y="1825623"/>
-          <a:ext cx="4343400" cy="1984376"/>
-        </p:xfrm>
-        <a:graphic>
-          <a:graphicData uri="http://schemas.openxmlformats.org/drawingml/2006/table">
-            <a:tbl>
-              <a:tblPr firstRow="1" bandRow="1">
-                <a:tableStyleId>{073A0DAA-6AF3-43AB-8588-CEC1D06C72B9}</a:tableStyleId>
-              </a:tblPr>
-              <a:tblGrid>
-                <a:gridCol w="1447800">
-                  <a:extLst>
-                    <a:ext uri="{9D8B030D-6E8A-4147-A177-3AD203B41FA5}">
-                      <a16:colId xmlns:a16="http://schemas.microsoft.com/office/drawing/2014/main" val="20000"/>
-                    </a:ext>
-                  </a:extLst>
-                </a:gridCol>
-                <a:gridCol w="1447800">
-                  <a:extLst>
-                    <a:ext uri="{9D8B030D-6E8A-4147-A177-3AD203B41FA5}">
-                      <a16:colId xmlns:a16="http://schemas.microsoft.com/office/drawing/2014/main" val="20001"/>
-                    </a:ext>
-                  </a:extLst>
-                </a:gridCol>
-                <a:gridCol w="1447800">
-                  <a:extLst>
-                    <a:ext uri="{9D8B030D-6E8A-4147-A177-3AD203B41FA5}">
-                      <a16:colId xmlns:a16="http://schemas.microsoft.com/office/drawing/2014/main" val="20002"/>
-                    </a:ext>
-                  </a:extLst>
-                </a:gridCol>
-              </a:tblGrid>
-              <a:tr h="496094">
-                <a:tc>
-                  <a:txBody>
-                    <a:bodyPr/>
-                    <a:lstStyle/>
-                    <a:p>
-                      <a:r>
-                        <a:rPr lang="en-US" dirty="0"/>
-                        <a:t>Class</a:t>
-                      </a:r>
-                      <a:endParaRPr dirty="0"/>
-                    </a:p>
-                  </a:txBody>
-                  <a:tcPr anchor="ctr"/>
-                </a:tc>
-                <a:tc>
-                  <a:txBody>
-                    <a:bodyPr/>
-                    <a:lstStyle/>
-                    <a:p>
-                      <a:pPr algn="ctr"/>
-                      <a:r>
-                        <a:rPr dirty="0"/>
-                        <a:t>Group 1</a:t>
-                      </a:r>
-                    </a:p>
-                  </a:txBody>
-                  <a:tcPr anchor="ctr"/>
-                </a:tc>
-                <a:tc>
-                  <a:txBody>
-                    <a:bodyPr/>
-                    <a:lstStyle/>
-                    <a:p>
-                      <a:pPr algn="ctr"/>
-                      <a:r>
-                        <a:t>Group 2</a:t>
-                      </a:r>
-                    </a:p>
-                  </a:txBody>
-                  <a:tcPr anchor="ctr"/>
-                </a:tc>
-                <a:extLst>
-                  <a:ext uri="{0D108BD9-81ED-4DB2-BD59-A6C34878D82A}">
-                    <a16:rowId xmlns:a16="http://schemas.microsoft.com/office/drawing/2014/main" val="10000"/>
-                  </a:ext>
-                </a:extLst>
-              </a:tr>
-              <a:tr h="496094">
-                <a:tc>
-                  <a:txBody>
-                    <a:bodyPr/>
-                    <a:lstStyle/>
-                    <a:p>
-                      <a:r>
-                        <a:t>Class 1</a:t>
-                      </a:r>
-                    </a:p>
-                  </a:txBody>
-                  <a:tcPr anchor="ctr"/>
-                </a:tc>
-                <a:tc>
-                  <a:txBody>
-                    <a:bodyPr/>
-                    <a:lstStyle/>
-                    <a:p>
-                      <a:pPr algn="ctr"/>
-                      <a:r>
-                        <a:t>82</a:t>
-                      </a:r>
-                    </a:p>
-                  </a:txBody>
-                  <a:tcPr anchor="ctr"/>
-                </a:tc>
-                <a:tc>
-                  <a:txBody>
-                    <a:bodyPr/>
-                    <a:lstStyle/>
-                    <a:p>
-                      <a:pPr algn="ctr"/>
-                      <a:r>
-                        <a:t>95</a:t>
-                      </a:r>
-                    </a:p>
-                  </a:txBody>
-                  <a:tcPr anchor="ctr"/>
-                </a:tc>
-                <a:extLst>
-                  <a:ext uri="{0D108BD9-81ED-4DB2-BD59-A6C34878D82A}">
-                    <a16:rowId xmlns:a16="http://schemas.microsoft.com/office/drawing/2014/main" val="10001"/>
-                  </a:ext>
-                </a:extLst>
-              </a:tr>
-              <a:tr h="496094">
-                <a:tc>
-                  <a:txBody>
-                    <a:bodyPr/>
-                    <a:lstStyle/>
-                    <a:p>
-                      <a:r>
-                        <a:t>Class</a:t>
-                      </a:r>
-                      <a:r>
-                        <a:rPr baseline="0"/>
-                        <a:t> 2</a:t>
-                      </a:r>
-                      <a:endParaRPr/>
-                    </a:p>
-                  </a:txBody>
-                  <a:tcPr anchor="ctr"/>
-                </a:tc>
-                <a:tc>
-                  <a:txBody>
-                    <a:bodyPr/>
-                    <a:lstStyle/>
-                    <a:p>
-                      <a:pPr algn="ctr"/>
-                      <a:r>
-                        <a:t>76</a:t>
-                      </a:r>
-                    </a:p>
-                  </a:txBody>
-                  <a:tcPr anchor="ctr"/>
-                </a:tc>
-                <a:tc>
-                  <a:txBody>
-                    <a:bodyPr/>
-                    <a:lstStyle/>
-                    <a:p>
-                      <a:pPr algn="ctr"/>
-                      <a:r>
-                        <a:t>88</a:t>
-                      </a:r>
-                    </a:p>
-                  </a:txBody>
-                  <a:tcPr anchor="ctr"/>
-                </a:tc>
-                <a:extLst>
-                  <a:ext uri="{0D108BD9-81ED-4DB2-BD59-A6C34878D82A}">
-                    <a16:rowId xmlns:a16="http://schemas.microsoft.com/office/drawing/2014/main" val="10002"/>
-                  </a:ext>
-                </a:extLst>
-              </a:tr>
-              <a:tr h="496094">
-                <a:tc>
-                  <a:txBody>
-                    <a:bodyPr/>
-                    <a:lstStyle/>
-                    <a:p>
-                      <a:r>
-                        <a:t>Class 3</a:t>
-                      </a:r>
-                    </a:p>
-                  </a:txBody>
-                  <a:tcPr anchor="ctr"/>
-                </a:tc>
-                <a:tc>
-                  <a:txBody>
-                    <a:bodyPr/>
-                    <a:lstStyle/>
-                    <a:p>
-                      <a:pPr algn="ctr"/>
-                      <a:r>
-                        <a:t>84</a:t>
-                      </a:r>
-                    </a:p>
-                  </a:txBody>
-                  <a:tcPr anchor="ctr"/>
-                </a:tc>
-                <a:tc>
-                  <a:txBody>
-                    <a:bodyPr/>
-                    <a:lstStyle/>
-                    <a:p>
-                      <a:pPr algn="ctr"/>
-                      <a:r>
-                        <a:rPr dirty="0"/>
-                        <a:t>90</a:t>
-                      </a:r>
-                    </a:p>
-                  </a:txBody>
-                  <a:tcPr anchor="ctr"/>
-                </a:tc>
-                <a:extLst>
-                  <a:ext uri="{0D108BD9-81ED-4DB2-BD59-A6C34878D82A}">
-                    <a16:rowId xmlns:a16="http://schemas.microsoft.com/office/drawing/2014/main" val="10003"/>
-                  </a:ext>
-                </a:extLst>
-              </a:tr>
-            </a:tbl>
-          </a:graphicData>
-        </a:graphic>
-      </p:graphicFrame>
     </p:spTree>
     <p:extLst>
       <p:ext uri="{BB962C8B-B14F-4D97-AF65-F5344CB8AC3E}">

</xml_diff>